<commit_message>
Added pdf version of project prosal report
And some changes in the proposal
</commit_message>
<xml_diff>
--- a/Project-Proposal/Automatic Braking System.pptx
+++ b/Project-Proposal/Automatic Braking System.pptx
@@ -842,7 +842,7 @@
           <a:p>
             <a:fld id="{2AC328AE-337C-4D31-8968-8BCE4DED6CBE}" type="datetimeFigureOut">
               <a:rPr lang="en-US" smtClean="0"/>
-              <a:t>9/19/2016</a:t>
+              <a:t>9/20/2016</a:t>
             </a:fld>
             <a:endParaRPr lang="en-US"/>
           </a:p>
@@ -1093,7 +1093,7 @@
           <a:p>
             <a:fld id="{2AC328AE-337C-4D31-8968-8BCE4DED6CBE}" type="datetimeFigureOut">
               <a:rPr lang="en-US" smtClean="0"/>
-              <a:t>9/19/2016</a:t>
+              <a:t>9/20/2016</a:t>
             </a:fld>
             <a:endParaRPr lang="en-US"/>
           </a:p>
@@ -1407,7 +1407,7 @@
           <a:p>
             <a:fld id="{2AC328AE-337C-4D31-8968-8BCE4DED6CBE}" type="datetimeFigureOut">
               <a:rPr lang="en-US" smtClean="0"/>
-              <a:t>9/19/2016</a:t>
+              <a:t>9/20/2016</a:t>
             </a:fld>
             <a:endParaRPr lang="en-US"/>
           </a:p>
@@ -1748,7 +1748,7 @@
           <a:p>
             <a:fld id="{2AC328AE-337C-4D31-8968-8BCE4DED6CBE}" type="datetimeFigureOut">
               <a:rPr lang="en-US" smtClean="0"/>
-              <a:t>9/19/2016</a:t>
+              <a:t>9/20/2016</a:t>
             </a:fld>
             <a:endParaRPr lang="en-US"/>
           </a:p>
@@ -2062,7 +2062,7 @@
           <a:p>
             <a:fld id="{2AC328AE-337C-4D31-8968-8BCE4DED6CBE}" type="datetimeFigureOut">
               <a:rPr lang="en-US" smtClean="0"/>
-              <a:t>9/19/2016</a:t>
+              <a:t>9/20/2016</a:t>
             </a:fld>
             <a:endParaRPr lang="en-US"/>
           </a:p>
@@ -2455,7 +2455,7 @@
           <a:p>
             <a:fld id="{2AC328AE-337C-4D31-8968-8BCE4DED6CBE}" type="datetimeFigureOut">
               <a:rPr lang="en-US" smtClean="0"/>
-              <a:t>9/19/2016</a:t>
+              <a:t>9/20/2016</a:t>
             </a:fld>
             <a:endParaRPr lang="en-US"/>
           </a:p>
@@ -2625,7 +2625,7 @@
           <a:p>
             <a:fld id="{2AC328AE-337C-4D31-8968-8BCE4DED6CBE}" type="datetimeFigureOut">
               <a:rPr lang="en-US" smtClean="0"/>
-              <a:t>9/19/2016</a:t>
+              <a:t>9/20/2016</a:t>
             </a:fld>
             <a:endParaRPr lang="en-US"/>
           </a:p>
@@ -2805,7 +2805,7 @@
           <a:p>
             <a:fld id="{2AC328AE-337C-4D31-8968-8BCE4DED6CBE}" type="datetimeFigureOut">
               <a:rPr lang="en-US" smtClean="0"/>
-              <a:t>9/19/2016</a:t>
+              <a:t>9/20/2016</a:t>
             </a:fld>
             <a:endParaRPr lang="en-US"/>
           </a:p>
@@ -2981,7 +2981,7 @@
           <a:p>
             <a:fld id="{2AC328AE-337C-4D31-8968-8BCE4DED6CBE}" type="datetimeFigureOut">
               <a:rPr lang="en-US" smtClean="0"/>
-              <a:t>9/19/2016</a:t>
+              <a:t>9/20/2016</a:t>
             </a:fld>
             <a:endParaRPr lang="en-US"/>
           </a:p>
@@ -3228,7 +3228,7 @@
           <a:p>
             <a:fld id="{2AC328AE-337C-4D31-8968-8BCE4DED6CBE}" type="datetimeFigureOut">
               <a:rPr lang="en-US" smtClean="0"/>
-              <a:t>9/19/2016</a:t>
+              <a:t>9/20/2016</a:t>
             </a:fld>
             <a:endParaRPr lang="en-US"/>
           </a:p>
@@ -3460,7 +3460,7 @@
           <a:p>
             <a:fld id="{2AC328AE-337C-4D31-8968-8BCE4DED6CBE}" type="datetimeFigureOut">
               <a:rPr lang="en-US" smtClean="0"/>
-              <a:t>9/19/2016</a:t>
+              <a:t>9/20/2016</a:t>
             </a:fld>
             <a:endParaRPr lang="en-US"/>
           </a:p>
@@ -3839,7 +3839,7 @@
           <a:p>
             <a:fld id="{2AC328AE-337C-4D31-8968-8BCE4DED6CBE}" type="datetimeFigureOut">
               <a:rPr lang="en-US" smtClean="0"/>
-              <a:t>9/19/2016</a:t>
+              <a:t>9/20/2016</a:t>
             </a:fld>
             <a:endParaRPr lang="en-US"/>
           </a:p>
@@ -3967,7 +3967,7 @@
           <a:p>
             <a:fld id="{2AC328AE-337C-4D31-8968-8BCE4DED6CBE}" type="datetimeFigureOut">
               <a:rPr lang="en-US" smtClean="0"/>
-              <a:t>9/19/2016</a:t>
+              <a:t>9/20/2016</a:t>
             </a:fld>
             <a:endParaRPr lang="en-US"/>
           </a:p>
@@ -4062,7 +4062,7 @@
           <a:p>
             <a:fld id="{2AC328AE-337C-4D31-8968-8BCE4DED6CBE}" type="datetimeFigureOut">
               <a:rPr lang="en-US" smtClean="0"/>
-              <a:t>9/19/2016</a:t>
+              <a:t>9/20/2016</a:t>
             </a:fld>
             <a:endParaRPr lang="en-US"/>
           </a:p>
@@ -4317,7 +4317,7 @@
           <a:p>
             <a:fld id="{2AC328AE-337C-4D31-8968-8BCE4DED6CBE}" type="datetimeFigureOut">
               <a:rPr lang="en-US" smtClean="0"/>
-              <a:t>9/19/2016</a:t>
+              <a:t>9/20/2016</a:t>
             </a:fld>
             <a:endParaRPr lang="en-US"/>
           </a:p>
@@ -4585,7 +4585,7 @@
           <a:p>
             <a:fld id="{2AC328AE-337C-4D31-8968-8BCE4DED6CBE}" type="datetimeFigureOut">
               <a:rPr lang="en-US" smtClean="0"/>
-              <a:t>9/19/2016</a:t>
+              <a:t>9/20/2016</a:t>
             </a:fld>
             <a:endParaRPr lang="en-US"/>
           </a:p>
@@ -5328,7 +5328,7 @@
           <a:p>
             <a:fld id="{2AC328AE-337C-4D31-8968-8BCE4DED6CBE}" type="datetimeFigureOut">
               <a:rPr lang="en-US" smtClean="0"/>
-              <a:t>9/19/2016</a:t>
+              <a:t>9/20/2016</a:t>
             </a:fld>
             <a:endParaRPr lang="en-US"/>
           </a:p>
@@ -5876,23 +5876,19 @@
           <a:p>
             <a:pPr algn="ctr"/>
             <a:r>
-              <a:rPr lang="en-US" sz="7800" dirty="0" smtClean="0">
+              <a:rPr lang="en-US" sz="7800" dirty="0">
                 <a:latin typeface="Times New Roman" panose="02020603050405020304" pitchFamily="18" charset="0"/>
                 <a:cs typeface="Times New Roman" panose="02020603050405020304" pitchFamily="18" charset="0"/>
               </a:rPr>
               <a:t>Automatic</a:t>
             </a:r>
             <a:r>
-              <a:rPr lang="en-US" sz="7000" dirty="0" smtClean="0">
+              <a:rPr lang="en-US" sz="7000" dirty="0">
                 <a:latin typeface="Times New Roman" panose="02020603050405020304" pitchFamily="18" charset="0"/>
                 <a:cs typeface="Times New Roman" panose="02020603050405020304" pitchFamily="18" charset="0"/>
               </a:rPr>
               <a:t> Braking System</a:t>
             </a:r>
-            <a:endParaRPr lang="en-US" sz="7000" dirty="0">
-              <a:latin typeface="Times New Roman" panose="02020603050405020304" pitchFamily="18" charset="0"/>
-              <a:cs typeface="Times New Roman" panose="02020603050405020304" pitchFamily="18" charset="0"/>
-            </a:endParaRPr>
           </a:p>
         </p:txBody>
       </p:sp>
@@ -5919,7 +5915,7 @@
           <a:lstStyle/>
           <a:p>
             <a:r>
-              <a:rPr lang="en-US" b="1" dirty="0" err="1" smtClean="0">
+              <a:rPr lang="en-US" b="1" dirty="0" err="1">
                 <a:solidFill>
                   <a:schemeClr val="tx1"/>
                 </a:solidFill>
@@ -5929,24 +5925,14 @@
               <a:t>Kamalpreet</a:t>
             </a:r>
             <a:r>
-              <a:rPr lang="en-US" b="1" dirty="0" smtClean="0">
+              <a:rPr lang="en-US" b="1" dirty="0">
                 <a:solidFill>
                   <a:schemeClr val="tx1"/>
                 </a:solidFill>
                 <a:latin typeface="Times New Roman" panose="02020603050405020304" pitchFamily="18" charset="0"/>
                 <a:cs typeface="Times New Roman" panose="02020603050405020304" pitchFamily="18" charset="0"/>
               </a:rPr>
-              <a:t> </a:t>
-            </a:r>
-            <a:r>
-              <a:rPr lang="en-US" b="1" dirty="0">
-                <a:solidFill>
-                  <a:schemeClr val="tx1"/>
-                </a:solidFill>
-                <a:latin typeface="Times New Roman" panose="02020603050405020304" pitchFamily="18" charset="0"/>
-                <a:cs typeface="Times New Roman" panose="02020603050405020304" pitchFamily="18" charset="0"/>
-              </a:rPr>
-              <a:t>Grewal</a:t>
+              <a:t> Grewal</a:t>
             </a:r>
           </a:p>
           <a:p>
@@ -5998,13 +5984,6 @@
   <p:clrMapOvr>
     <a:masterClrMapping/>
   </p:clrMapOvr>
-  <p:timing>
-    <p:tnLst>
-      <p:par>
-        <p:cTn id="1" dur="indefinite" restart="never" nodeType="tmRoot"/>
-      </p:par>
-    </p:tnLst>
-  </p:timing>
 </p:sld>
 </file>
 
@@ -6083,62 +6062,22 @@
               <a:buNone/>
             </a:pPr>
             <a:r>
-              <a:rPr lang="en-US" sz="2000" dirty="0" smtClean="0">
+              <a:rPr lang="en-US" sz="2000" dirty="0">
                 <a:solidFill>
                   <a:schemeClr val="tx1"/>
                 </a:solidFill>
                 <a:latin typeface="Times New Roman" panose="02020603050405020304" pitchFamily="18" charset="0"/>
                 <a:cs typeface="Times New Roman" panose="02020603050405020304" pitchFamily="18" charset="0"/>
               </a:rPr>
-              <a:t>Present a Project </a:t>
-            </a:r>
+              <a:t>Present a Project proposal in automotive domain based on ARM Cortex M0.</a:t>
+            </a:r>
+          </a:p>
+          <a:p>
+            <a:pPr marL="0" indent="0">
+              <a:buNone/>
+            </a:pPr>
             <a:r>
               <a:rPr lang="en-US" sz="2000" dirty="0">
-                <a:solidFill>
-                  <a:schemeClr val="tx1"/>
-                </a:solidFill>
-                <a:latin typeface="Times New Roman" panose="02020603050405020304" pitchFamily="18" charset="0"/>
-                <a:cs typeface="Times New Roman" panose="02020603050405020304" pitchFamily="18" charset="0"/>
-              </a:rPr>
-              <a:t>proposal </a:t>
-            </a:r>
-            <a:r>
-              <a:rPr lang="en-US" sz="2000" dirty="0" smtClean="0">
-                <a:solidFill>
-                  <a:schemeClr val="tx1"/>
-                </a:solidFill>
-                <a:latin typeface="Times New Roman" panose="02020603050405020304" pitchFamily="18" charset="0"/>
-                <a:cs typeface="Times New Roman" panose="02020603050405020304" pitchFamily="18" charset="0"/>
-              </a:rPr>
-              <a:t>in </a:t>
-            </a:r>
-            <a:r>
-              <a:rPr lang="en-US" sz="2000" dirty="0">
-                <a:solidFill>
-                  <a:schemeClr val="tx1"/>
-                </a:solidFill>
-                <a:latin typeface="Times New Roman" panose="02020603050405020304" pitchFamily="18" charset="0"/>
-                <a:cs typeface="Times New Roman" panose="02020603050405020304" pitchFamily="18" charset="0"/>
-              </a:rPr>
-              <a:t>automotive </a:t>
-            </a:r>
-            <a:r>
-              <a:rPr lang="en-US" sz="2000" dirty="0" smtClean="0">
-                <a:solidFill>
-                  <a:schemeClr val="tx1"/>
-                </a:solidFill>
-                <a:latin typeface="Times New Roman" panose="02020603050405020304" pitchFamily="18" charset="0"/>
-                <a:cs typeface="Times New Roman" panose="02020603050405020304" pitchFamily="18" charset="0"/>
-              </a:rPr>
-              <a:t>domain based on ARM Cortex M0.</a:t>
-            </a:r>
-          </a:p>
-          <a:p>
-            <a:pPr marL="0" indent="0">
-              <a:buNone/>
-            </a:pPr>
-            <a:r>
-              <a:rPr lang="en-US" sz="2000" dirty="0" smtClean="0">
                 <a:solidFill>
                   <a:schemeClr val="tx1"/>
                 </a:solidFill>
@@ -6147,13 +6086,6 @@
               </a:rPr>
               <a:t>The Proposal consists of below elements</a:t>
             </a:r>
-            <a:endParaRPr lang="en-US" sz="2000" dirty="0">
-              <a:solidFill>
-                <a:schemeClr val="tx1"/>
-              </a:solidFill>
-              <a:latin typeface="Times New Roman" panose="02020603050405020304" pitchFamily="18" charset="0"/>
-              <a:cs typeface="Times New Roman" panose="02020603050405020304" pitchFamily="18" charset="0"/>
-            </a:endParaRPr>
           </a:p>
           <a:p>
             <a:r>
@@ -6239,13 +6171,6 @@
   <p:clrMapOvr>
     <a:masterClrMapping/>
   </p:clrMapOvr>
-  <p:timing>
-    <p:tnLst>
-      <p:par>
-        <p:cTn id="1" dur="indefinite" restart="never" nodeType="tmRoot"/>
-      </p:par>
-    </p:tnLst>
-  </p:timing>
 </p:sld>
 </file>
 
@@ -6353,27 +6278,7 @@
                 <a:latin typeface="Times New Roman" panose="02020603050405020304" pitchFamily="18" charset="0"/>
                 <a:cs typeface="Times New Roman" panose="02020603050405020304" pitchFamily="18" charset="0"/>
               </a:rPr>
-              <a:t>Design and implement Automatic Braking system based on ARM Cortex – </a:t>
-            </a:r>
-            <a:r>
-              <a:rPr lang="en-US" dirty="0" smtClean="0">
-                <a:solidFill>
-                  <a:schemeClr val="tx1"/>
-                </a:solidFill>
-                <a:latin typeface="Times New Roman" panose="02020603050405020304" pitchFamily="18" charset="0"/>
-                <a:cs typeface="Times New Roman" panose="02020603050405020304" pitchFamily="18" charset="0"/>
-              </a:rPr>
-              <a:t>M0 </a:t>
-            </a:r>
-            <a:r>
-              <a:rPr lang="en-US" dirty="0">
-                <a:solidFill>
-                  <a:schemeClr val="tx1"/>
-                </a:solidFill>
-                <a:latin typeface="Times New Roman" panose="02020603050405020304" pitchFamily="18" charset="0"/>
-                <a:cs typeface="Times New Roman" panose="02020603050405020304" pitchFamily="18" charset="0"/>
-              </a:rPr>
-              <a:t>microcontroller to detect obstacle for  automotive vehicles and prevent it from colliding against the obstacle by braking the system and disabling the acceleration.</a:t>
+              <a:t>Design and implement Automatic Braking system based on ARM Cortex – M0+ microcontroller to detect obstacle for  automotive vehicles and prevent it from colliding against the obstacle by braking the system and disabling the acceleration.</a:t>
             </a:r>
           </a:p>
           <a:p>
@@ -6445,13 +6350,6 @@
   <p:clrMapOvr>
     <a:masterClrMapping/>
   </p:clrMapOvr>
-  <p:timing>
-    <p:tnLst>
-      <p:par>
-        <p:cTn id="1" dur="indefinite" restart="never" nodeType="tmRoot"/>
-      </p:par>
-    </p:tnLst>
-  </p:timing>
 </p:sld>
 </file>
 
@@ -6618,13 +6516,6 @@
   <p:clrMapOvr>
     <a:masterClrMapping/>
   </p:clrMapOvr>
-  <p:timing>
-    <p:tnLst>
-      <p:par>
-        <p:cTn id="1" dur="indefinite" restart="never" nodeType="tmRoot"/>
-      </p:par>
-    </p:tnLst>
-  </p:timing>
 </p:sld>
 </file>
 
@@ -6742,7 +6633,7 @@
           <p:nvPr>
             <p:extLst>
               <p:ext uri="{D42A27DB-BD31-4B8C-83A1-F6EECF244321}">
-                <p14:modId xmlns:p14="http://schemas.microsoft.com/office/powerpoint/2010/main" val="4206468844"/>
+                <p14:modId xmlns:p14="http://schemas.microsoft.com/office/powerpoint/2010/main" val="2856546307"/>
               </p:ext>
             </p:extLst>
           </p:nvPr>
@@ -6755,12 +6646,12 @@
           <a:graphicData uri="http://schemas.openxmlformats.org/presentationml/2006/ole">
             <mc:AlternateContent xmlns:mc="http://schemas.openxmlformats.org/markup-compatibility/2006">
               <mc:Choice xmlns:v="urn:schemas-microsoft-com:vml" Requires="v">
-                <p:oleObj spid="_x0000_s1128" name="Visio" r:id="rId4" imgW="7121515" imgH="3491100" progId="Visio.Drawing.15">
+                <p:oleObj spid="_x0000_s1130" name="Visio" r:id="rId3" imgW="7121580" imgH="3491321" progId="Visio.Drawing.15">
                   <p:embed/>
                 </p:oleObj>
               </mc:Choice>
               <mc:Fallback>
-                <p:oleObj name="Visio" r:id="rId4" imgW="7121515" imgH="3491100" progId="Visio.Drawing.15">
+                <p:oleObj name="Visio" r:id="rId3" imgW="7121580" imgH="3491321" progId="Visio.Drawing.15">
                   <p:embed/>
                   <p:pic>
                     <p:nvPicPr>
@@ -6771,13 +6662,7 @@
                       <p:nvPr/>
                     </p:nvPicPr>
                     <p:blipFill>
-                      <a:blip r:embed="rId5">
-                        <a:extLst>
-                          <a:ext uri="{28A0092B-C50C-407E-A947-70E740481C1C}">
-                            <a14:useLocalDpi xmlns:a14="http://schemas.microsoft.com/office/drawing/2010/main" val="0"/>
-                          </a:ext>
-                        </a:extLst>
-                      </a:blip>
+                      <a:blip r:embed="rId4"/>
                       <a:srcRect/>
                       <a:stretch>
                         <a:fillRect/>
@@ -6819,13 +6704,6 @@
   <p:clrMapOvr>
     <a:masterClrMapping/>
   </p:clrMapOvr>
-  <p:timing>
-    <p:tnLst>
-      <p:par>
-        <p:cTn id="1" dur="indefinite" restart="never" nodeType="tmRoot"/>
-      </p:par>
-    </p:tnLst>
-  </p:timing>
 </p:sld>
 </file>
 
@@ -6862,16 +6740,12 @@
           <a:lstStyle/>
           <a:p>
             <a:r>
-              <a:rPr lang="en-US" dirty="0" smtClean="0">
+              <a:rPr lang="en-US" dirty="0">
                 <a:latin typeface="Times New Roman" panose="02020603050405020304" pitchFamily="18" charset="0"/>
                 <a:cs typeface="Times New Roman" panose="02020603050405020304" pitchFamily="18" charset="0"/>
               </a:rPr>
               <a:t>Project Development Process</a:t>
             </a:r>
-            <a:endParaRPr lang="en-US" dirty="0">
-              <a:latin typeface="Times New Roman" panose="02020603050405020304" pitchFamily="18" charset="0"/>
-              <a:cs typeface="Times New Roman" panose="02020603050405020304" pitchFamily="18" charset="0"/>
-            </a:endParaRPr>
           </a:p>
         </p:txBody>
       </p:sp>
@@ -6960,13 +6834,6 @@
   <p:clrMapOvr>
     <a:masterClrMapping/>
   </p:clrMapOvr>
-  <p:timing>
-    <p:tnLst>
-      <p:par>
-        <p:cTn id="1" dur="indefinite" restart="never" nodeType="tmRoot"/>
-      </p:par>
-    </p:tnLst>
-  </p:timing>
 </p:sld>
 </file>
 
@@ -7055,13 +6922,6 @@
   <p:clrMapOvr>
     <a:masterClrMapping/>
   </p:clrMapOvr>
-  <p:timing>
-    <p:tnLst>
-      <p:par>
-        <p:cTn id="1" dur="indefinite" restart="never" nodeType="tmRoot"/>
-      </p:par>
-    </p:tnLst>
-  </p:timing>
 </p:sld>
 </file>
 
@@ -7136,35 +6996,35 @@
                 <a:gridCol w="933129">
                   <a:extLst>
                     <a:ext uri="{9D8B030D-6E8A-4147-A177-3AD203B41FA5}">
-                      <a16:colId xmlns:a16="http://schemas.microsoft.com/office/drawing/2014/main" xmlns="" val="20000"/>
+                      <a16:colId xmlns:a16="http://schemas.microsoft.com/office/drawing/2014/main" val="20000"/>
                     </a:ext>
                   </a:extLst>
                 </a:gridCol>
                 <a:gridCol w="2670982">
                   <a:extLst>
                     <a:ext uri="{9D8B030D-6E8A-4147-A177-3AD203B41FA5}">
-                      <a16:colId xmlns:a16="http://schemas.microsoft.com/office/drawing/2014/main" xmlns="" val="20001"/>
+                      <a16:colId xmlns:a16="http://schemas.microsoft.com/office/drawing/2014/main" val="20001"/>
                     </a:ext>
                   </a:extLst>
                 </a:gridCol>
                 <a:gridCol w="1383217">
                   <a:extLst>
                     <a:ext uri="{9D8B030D-6E8A-4147-A177-3AD203B41FA5}">
-                      <a16:colId xmlns:a16="http://schemas.microsoft.com/office/drawing/2014/main" xmlns="" val="20002"/>
+                      <a16:colId xmlns:a16="http://schemas.microsoft.com/office/drawing/2014/main" val="20002"/>
                     </a:ext>
                   </a:extLst>
                 </a:gridCol>
                 <a:gridCol w="1594391">
                   <a:extLst>
                     <a:ext uri="{9D8B030D-6E8A-4147-A177-3AD203B41FA5}">
-                      <a16:colId xmlns:a16="http://schemas.microsoft.com/office/drawing/2014/main" xmlns="" val="20003"/>
+                      <a16:colId xmlns:a16="http://schemas.microsoft.com/office/drawing/2014/main" val="20003"/>
                     </a:ext>
                   </a:extLst>
                 </a:gridCol>
                 <a:gridCol w="1594391">
                   <a:extLst>
                     <a:ext uri="{9D8B030D-6E8A-4147-A177-3AD203B41FA5}">
-                      <a16:colId xmlns:a16="http://schemas.microsoft.com/office/drawing/2014/main" xmlns="" val="20004"/>
+                      <a16:colId xmlns:a16="http://schemas.microsoft.com/office/drawing/2014/main" val="20004"/>
                     </a:ext>
                   </a:extLst>
                 </a:gridCol>
@@ -7257,7 +7117,7 @@
                 </a:tc>
                 <a:extLst>
                   <a:ext uri="{0D108BD9-81ED-4DB2-BD59-A6C34878D82A}">
-                    <a16:rowId xmlns:a16="http://schemas.microsoft.com/office/drawing/2014/main" xmlns="" val="10000"/>
+                    <a16:rowId xmlns:a16="http://schemas.microsoft.com/office/drawing/2014/main" val="10000"/>
                   </a:ext>
                 </a:extLst>
               </a:tr>
@@ -7442,7 +7302,7 @@
                 </a:tc>
                 <a:extLst>
                   <a:ext uri="{0D108BD9-81ED-4DB2-BD59-A6C34878D82A}">
-                    <a16:rowId xmlns:a16="http://schemas.microsoft.com/office/drawing/2014/main" xmlns="" val="10001"/>
+                    <a16:rowId xmlns:a16="http://schemas.microsoft.com/office/drawing/2014/main" val="10001"/>
                   </a:ext>
                 </a:extLst>
               </a:tr>
@@ -7620,7 +7480,7 @@
                 </a:tc>
                 <a:extLst>
                   <a:ext uri="{0D108BD9-81ED-4DB2-BD59-A6C34878D82A}">
-                    <a16:rowId xmlns:a16="http://schemas.microsoft.com/office/drawing/2014/main" xmlns="" val="10002"/>
+                    <a16:rowId xmlns:a16="http://schemas.microsoft.com/office/drawing/2014/main" val="10002"/>
                   </a:ext>
                 </a:extLst>
               </a:tr>
@@ -7768,7 +7628,7 @@
                 </a:tc>
                 <a:extLst>
                   <a:ext uri="{0D108BD9-81ED-4DB2-BD59-A6C34878D82A}">
-                    <a16:rowId xmlns:a16="http://schemas.microsoft.com/office/drawing/2014/main" xmlns="" val="10003"/>
+                    <a16:rowId xmlns:a16="http://schemas.microsoft.com/office/drawing/2014/main" val="10003"/>
                   </a:ext>
                 </a:extLst>
               </a:tr>
@@ -7915,7 +7775,7 @@
                 </a:tc>
                 <a:extLst>
                   <a:ext uri="{0D108BD9-81ED-4DB2-BD59-A6C34878D82A}">
-                    <a16:rowId xmlns:a16="http://schemas.microsoft.com/office/drawing/2014/main" xmlns="" val="10004"/>
+                    <a16:rowId xmlns:a16="http://schemas.microsoft.com/office/drawing/2014/main" val="10004"/>
                   </a:ext>
                 </a:extLst>
               </a:tr>
@@ -8004,7 +7864,7 @@
                 </a:tc>
                 <a:extLst>
                   <a:ext uri="{0D108BD9-81ED-4DB2-BD59-A6C34878D82A}">
-                    <a16:rowId xmlns:a16="http://schemas.microsoft.com/office/drawing/2014/main" xmlns="" val="10005"/>
+                    <a16:rowId xmlns:a16="http://schemas.microsoft.com/office/drawing/2014/main" val="10005"/>
                   </a:ext>
                 </a:extLst>
               </a:tr>
@@ -8243,10 +8103,6 @@
             </a:lvl9pPr>
           </a:lstStyle>
           <a:p>
-            <a:r>
-              <a:rPr lang="en-US" dirty="0"/>
-              <a:t/>
-            </a:r>
             <a:br>
               <a:rPr lang="en-US" dirty="0"/>
             </a:br>
@@ -8604,10 +8460,6 @@
             </a:lvl9pPr>
           </a:lstStyle>
           <a:p>
-            <a:r>
-              <a:rPr lang="en-US" dirty="0"/>
-              <a:t/>
-            </a:r>
             <a:br>
               <a:rPr lang="en-US" dirty="0"/>
             </a:br>
@@ -8718,10 +8570,6 @@
             </a:r>
           </a:p>
           <a:p>
-            <a:r>
-              <a:rPr lang="en-US" dirty="0"/>
-              <a:t/>
-            </a:r>
             <a:br>
               <a:rPr lang="en-US" dirty="0"/>
             </a:br>
@@ -9235,18 +9083,11 @@
               <a:buNone/>
             </a:pPr>
             <a:r>
-              <a:rPr lang="en-US" dirty="0" smtClean="0">
-                <a:latin typeface="Times New Roman" panose="02020603050405020304" pitchFamily="18" charset="0"/>
-                <a:cs typeface="Times New Roman" panose="02020603050405020304" pitchFamily="18" charset="0"/>
-              </a:rPr>
-              <a:t>https</a:t>
-            </a:r>
-            <a:r>
               <a:rPr lang="en-US" dirty="0">
                 <a:latin typeface="Times New Roman" panose="02020603050405020304" pitchFamily="18" charset="0"/>
                 <a:cs typeface="Times New Roman" panose="02020603050405020304" pitchFamily="18" charset="0"/>
               </a:rPr>
-              <a:t>://github.com/gsanthar/Automatic-Braking-System</a:t>
+              <a:t>https://github.com/gsanthar/Automatic-Braking-System</a:t>
             </a:r>
           </a:p>
         </p:txBody>

</xml_diff>